<commit_message>
a few more slides outlining our method
</commit_message>
<xml_diff>
--- a/presentations/Dataset-update-hack-presentation.pptx
+++ b/presentations/Dataset-update-hack-presentation.pptx
@@ -10,6 +10,9 @@
     <p:sldId id="258" r:id="rId4"/>
     <p:sldId id="259" r:id="rId5"/>
     <p:sldId id="260" r:id="rId6"/>
+    <p:sldId id="261" r:id="rId7"/>
+    <p:sldId id="262" r:id="rId8"/>
+    <p:sldId id="263" r:id="rId9"/>
   </p:sldIdLst>
   <p:sldSz cx="9144000" cy="6858000" type="screen4x3"/>
   <p:notesSz cx="6858000" cy="9144000"/>
@@ -3523,25 +3526,6 @@
           </a:p>
         </p:txBody>
       </p:sp>
-      <p:sp>
-        <p:nvSpPr>
-          <p:cNvPr id="4" name="Subtitle 3"/>
-          <p:cNvSpPr>
-            <a:spLocks noGrp="1"/>
-          </p:cNvSpPr>
-          <p:nvPr>
-            <p:ph type="subTitle" idx="1"/>
-          </p:nvPr>
-        </p:nvSpPr>
-        <p:spPr/>
-        <p:txBody>
-          <a:bodyPr/>
-          <a:lstStyle/>
-          <a:p>
-            <a:endParaRPr lang="en-GB"/>
-          </a:p>
-        </p:txBody>
-      </p:sp>
     </p:spTree>
     <p:extLst>
       <p:ext uri="{BB962C8B-B14F-4D97-AF65-F5344CB8AC3E}">
@@ -3593,11 +3577,7 @@
             </a:r>
             <a:r>
               <a:rPr lang="en-GB" smtClean="0"/>
-              <a:t>for </a:t>
-            </a:r>
-            <a:r>
-              <a:rPr lang="en-GB" smtClean="0"/>
-              <a:t>data</a:t>
+              <a:t>for data</a:t>
             </a:r>
             <a:endParaRPr lang="en-GB" dirty="0"/>
           </a:p>
@@ -3652,6 +3632,482 @@
     <p:extLst>
       <p:ext uri="{BB962C8B-B14F-4D97-AF65-F5344CB8AC3E}">
         <p14:creationId xmlns:p14="http://schemas.microsoft.com/office/powerpoint/2010/main" val="3914627351"/>
+      </p:ext>
+    </p:extLst>
+  </p:cSld>
+  <p:clrMapOvr>
+    <a:masterClrMapping/>
+  </p:clrMapOvr>
+</p:sld>
+</file>
+
+<file path=ppt/slides/slide6.xml><?xml version="1.0" encoding="utf-8"?>
+<p:sld xmlns:a="http://schemas.openxmlformats.org/drawingml/2006/main" xmlns:r="http://schemas.openxmlformats.org/officeDocument/2006/relationships" xmlns:p="http://schemas.openxmlformats.org/presentationml/2006/main">
+  <p:cSld>
+    <p:spTree>
+      <p:nvGrpSpPr>
+        <p:cNvPr id="1" name=""/>
+        <p:cNvGrpSpPr/>
+        <p:nvPr/>
+      </p:nvGrpSpPr>
+      <p:grpSpPr>
+        <a:xfrm>
+          <a:off x="0" y="0"/>
+          <a:ext cx="0" cy="0"/>
+          <a:chOff x="0" y="0"/>
+          <a:chExt cx="0" cy="0"/>
+        </a:xfrm>
+      </p:grpSpPr>
+      <p:sp>
+        <p:nvSpPr>
+          <p:cNvPr id="2" name="Title 1"/>
+          <p:cNvSpPr>
+            <a:spLocks noGrp="1"/>
+          </p:cNvSpPr>
+          <p:nvPr>
+            <p:ph type="title"/>
+          </p:nvPr>
+        </p:nvSpPr>
+        <p:spPr>
+          <a:xfrm>
+            <a:off x="467544" y="150434"/>
+            <a:ext cx="8229600" cy="1143000"/>
+          </a:xfrm>
+        </p:spPr>
+        <p:txBody>
+          <a:bodyPr/>
+          <a:lstStyle/>
+          <a:p>
+            <a:r>
+              <a:rPr lang="en-GB" dirty="0" smtClean="0"/>
+              <a:t>Find a dataset DOI</a:t>
+            </a:r>
+            <a:endParaRPr lang="en-GB" dirty="0"/>
+          </a:p>
+        </p:txBody>
+      </p:sp>
+      <p:pic>
+        <p:nvPicPr>
+          <p:cNvPr id="1027" name="Picture 3"/>
+          <p:cNvPicPr>
+            <a:picLocks noChangeAspect="1" noChangeArrowheads="1"/>
+          </p:cNvPicPr>
+          <p:nvPr/>
+        </p:nvPicPr>
+        <p:blipFill>
+          <a:blip r:embed="rId2">
+            <a:extLst>
+              <a:ext uri="{28A0092B-C50C-407E-A947-70E740481C1C}">
+                <a14:useLocalDpi xmlns:a14="http://schemas.microsoft.com/office/drawing/2010/main" val="0"/>
+              </a:ext>
+            </a:extLst>
+          </a:blip>
+          <a:srcRect/>
+          <a:stretch>
+            <a:fillRect/>
+          </a:stretch>
+        </p:blipFill>
+        <p:spPr bwMode="auto">
+          <a:xfrm>
+            <a:off x="755576" y="1268760"/>
+            <a:ext cx="5808316" cy="3869605"/>
+          </a:xfrm>
+          <a:prstGeom prst="rect">
+            <a:avLst/>
+          </a:prstGeom>
+          <a:ln>
+            <a:noFill/>
+          </a:ln>
+          <a:effectLst>
+            <a:outerShdw blurRad="292100" dist="139700" dir="2700000" algn="tl" rotWithShape="0">
+              <a:srgbClr val="333333">
+                <a:alpha val="65000"/>
+              </a:srgbClr>
+            </a:outerShdw>
+          </a:effectLst>
+          <a:extLst>
+            <a:ext uri="{909E8E84-426E-40DD-AFC4-6F175D3DCCD1}">
+              <a14:hiddenFill xmlns:a14="http://schemas.microsoft.com/office/drawing/2010/main">
+                <a:solidFill>
+                  <a:schemeClr val="accent1"/>
+                </a:solidFill>
+              </a14:hiddenFill>
+            </a:ext>
+            <a:ext uri="{91240B29-F687-4F45-9708-019B960494DF}">
+              <a14:hiddenLine xmlns:a14="http://schemas.microsoft.com/office/drawing/2010/main" w="9525">
+                <a:solidFill>
+                  <a:schemeClr val="tx1"/>
+                </a:solidFill>
+                <a:miter lim="800000"/>
+                <a:headEnd/>
+                <a:tailEnd/>
+              </a14:hiddenLine>
+            </a:ext>
+            <a:ext uri="{AF507438-7753-43E0-B8FC-AC1667EBCBE1}">
+              <a14:hiddenEffects xmlns:a14="http://schemas.microsoft.com/office/drawing/2010/main">
+                <a:effectLst>
+                  <a:outerShdw dist="35921" dir="2700000" algn="ctr" rotWithShape="0">
+                    <a:schemeClr val="bg2"/>
+                  </a:outerShdw>
+                </a:effectLst>
+              </a14:hiddenEffects>
+            </a:ext>
+          </a:extLst>
+        </p:spPr>
+      </p:pic>
+      <p:pic>
+        <p:nvPicPr>
+          <p:cNvPr id="1026" name="Picture 2"/>
+          <p:cNvPicPr>
+            <a:picLocks noChangeAspect="1" noChangeArrowheads="1"/>
+          </p:cNvPicPr>
+          <p:nvPr/>
+        </p:nvPicPr>
+        <p:blipFill>
+          <a:blip r:embed="rId3">
+            <a:extLst>
+              <a:ext uri="{28A0092B-C50C-407E-A947-70E740481C1C}">
+                <a14:useLocalDpi xmlns:a14="http://schemas.microsoft.com/office/drawing/2010/main" val="0"/>
+              </a:ext>
+            </a:extLst>
+          </a:blip>
+          <a:srcRect/>
+          <a:stretch>
+            <a:fillRect/>
+          </a:stretch>
+        </p:blipFill>
+        <p:spPr bwMode="auto">
+          <a:xfrm>
+            <a:off x="1979712" y="4509120"/>
+            <a:ext cx="6455618" cy="1966029"/>
+          </a:xfrm>
+          <a:prstGeom prst="rect">
+            <a:avLst/>
+          </a:prstGeom>
+          <a:ln>
+            <a:noFill/>
+          </a:ln>
+          <a:effectLst>
+            <a:outerShdw blurRad="292100" dist="139700" dir="2700000" algn="tl" rotWithShape="0">
+              <a:srgbClr val="333333">
+                <a:alpha val="65000"/>
+              </a:srgbClr>
+            </a:outerShdw>
+          </a:effectLst>
+          <a:extLst>
+            <a:ext uri="{909E8E84-426E-40DD-AFC4-6F175D3DCCD1}">
+              <a14:hiddenFill xmlns:a14="http://schemas.microsoft.com/office/drawing/2010/main">
+                <a:solidFill>
+                  <a:schemeClr val="accent1"/>
+                </a:solidFill>
+              </a14:hiddenFill>
+            </a:ext>
+            <a:ext uri="{91240B29-F687-4F45-9708-019B960494DF}">
+              <a14:hiddenLine xmlns:a14="http://schemas.microsoft.com/office/drawing/2010/main" w="9525">
+                <a:solidFill>
+                  <a:schemeClr val="tx1"/>
+                </a:solidFill>
+                <a:miter lim="800000"/>
+                <a:headEnd/>
+                <a:tailEnd/>
+              </a14:hiddenLine>
+            </a:ext>
+            <a:ext uri="{AF507438-7753-43E0-B8FC-AC1667EBCBE1}">
+              <a14:hiddenEffects xmlns:a14="http://schemas.microsoft.com/office/drawing/2010/main">
+                <a:effectLst>
+                  <a:outerShdw dist="35921" dir="2700000" algn="ctr" rotWithShape="0">
+                    <a:schemeClr val="bg2"/>
+                  </a:outerShdw>
+                </a:effectLst>
+              </a14:hiddenEffects>
+            </a:ext>
+          </a:extLst>
+        </p:spPr>
+      </p:pic>
+      <p:cxnSp>
+        <p:nvCxnSpPr>
+          <p:cNvPr id="6" name="Straight Arrow Connector 5"/>
+          <p:cNvCxnSpPr/>
+          <p:nvPr/>
+        </p:nvCxnSpPr>
+        <p:spPr>
+          <a:xfrm flipH="1">
+            <a:off x="7488324" y="4293096"/>
+            <a:ext cx="1188132" cy="1199038"/>
+          </a:xfrm>
+          <a:prstGeom prst="straightConnector1">
+            <a:avLst/>
+          </a:prstGeom>
+          <a:ln w="57150">
+            <a:solidFill>
+              <a:srgbClr val="FF0000"/>
+            </a:solidFill>
+            <a:tailEnd type="arrow"/>
+          </a:ln>
+        </p:spPr>
+        <p:style>
+          <a:lnRef idx="1">
+            <a:schemeClr val="accent1"/>
+          </a:lnRef>
+          <a:fillRef idx="0">
+            <a:schemeClr val="accent1"/>
+          </a:fillRef>
+          <a:effectRef idx="0">
+            <a:schemeClr val="accent1"/>
+          </a:effectRef>
+          <a:fontRef idx="minor">
+            <a:schemeClr val="tx1"/>
+          </a:fontRef>
+        </p:style>
+      </p:cxnSp>
+    </p:spTree>
+    <p:extLst>
+      <p:ext uri="{BB962C8B-B14F-4D97-AF65-F5344CB8AC3E}">
+        <p14:creationId xmlns:p14="http://schemas.microsoft.com/office/powerpoint/2010/main" val="2689813442"/>
+      </p:ext>
+    </p:extLst>
+  </p:cSld>
+  <p:clrMapOvr>
+    <a:masterClrMapping/>
+  </p:clrMapOvr>
+</p:sld>
+</file>
+
+<file path=ppt/slides/slide7.xml><?xml version="1.0" encoding="utf-8"?>
+<p:sld xmlns:a="http://schemas.openxmlformats.org/drawingml/2006/main" xmlns:r="http://schemas.openxmlformats.org/officeDocument/2006/relationships" xmlns:p="http://schemas.openxmlformats.org/presentationml/2006/main">
+  <p:cSld>
+    <p:spTree>
+      <p:nvGrpSpPr>
+        <p:cNvPr id="1" name=""/>
+        <p:cNvGrpSpPr/>
+        <p:nvPr/>
+      </p:nvGrpSpPr>
+      <p:grpSpPr>
+        <a:xfrm>
+          <a:off x="0" y="0"/>
+          <a:ext cx="0" cy="0"/>
+          <a:chOff x="0" y="0"/>
+          <a:chExt cx="0" cy="0"/>
+        </a:xfrm>
+      </p:grpSpPr>
+      <p:sp>
+        <p:nvSpPr>
+          <p:cNvPr id="2" name="Title 1"/>
+          <p:cNvSpPr>
+            <a:spLocks noGrp="1"/>
+          </p:cNvSpPr>
+          <p:nvPr>
+            <p:ph type="title"/>
+          </p:nvPr>
+        </p:nvSpPr>
+        <p:spPr/>
+        <p:txBody>
+          <a:bodyPr>
+            <a:normAutofit fontScale="90000"/>
+          </a:bodyPr>
+          <a:lstStyle/>
+          <a:p>
+            <a:r>
+              <a:rPr lang="en-GB" dirty="0" smtClean="0"/>
+              <a:t>Call the </a:t>
+            </a:r>
+            <a:r>
+              <a:rPr lang="en-GB" dirty="0" err="1" smtClean="0"/>
+              <a:t>figshare</a:t>
+            </a:r>
+            <a:r>
+              <a:rPr lang="en-GB" dirty="0" smtClean="0"/>
+              <a:t> API to see whether there has been an update</a:t>
+            </a:r>
+            <a:endParaRPr lang="en-GB" dirty="0"/>
+          </a:p>
+        </p:txBody>
+      </p:sp>
+      <p:pic>
+        <p:nvPicPr>
+          <p:cNvPr id="2050" name="Picture 2"/>
+          <p:cNvPicPr>
+            <a:picLocks noChangeAspect="1" noChangeArrowheads="1"/>
+          </p:cNvPicPr>
+          <p:nvPr/>
+        </p:nvPicPr>
+        <p:blipFill>
+          <a:blip r:embed="rId2">
+            <a:extLst>
+              <a:ext uri="{28A0092B-C50C-407E-A947-70E740481C1C}">
+                <a14:useLocalDpi xmlns:a14="http://schemas.microsoft.com/office/drawing/2010/main" val="0"/>
+              </a:ext>
+            </a:extLst>
+          </a:blip>
+          <a:srcRect/>
+          <a:stretch>
+            <a:fillRect/>
+          </a:stretch>
+        </p:blipFill>
+        <p:spPr bwMode="auto">
+          <a:xfrm>
+            <a:off x="267982" y="1664804"/>
+            <a:ext cx="8490233" cy="4608512"/>
+          </a:xfrm>
+          <a:prstGeom prst="rect">
+            <a:avLst/>
+          </a:prstGeom>
+          <a:ln>
+            <a:noFill/>
+          </a:ln>
+          <a:effectLst>
+            <a:outerShdw blurRad="292100" dist="139700" dir="2700000" algn="tl" rotWithShape="0">
+              <a:srgbClr val="333333">
+                <a:alpha val="65000"/>
+              </a:srgbClr>
+            </a:outerShdw>
+          </a:effectLst>
+          <a:extLst>
+            <a:ext uri="{909E8E84-426E-40DD-AFC4-6F175D3DCCD1}">
+              <a14:hiddenFill xmlns:a14="http://schemas.microsoft.com/office/drawing/2010/main">
+                <a:solidFill>
+                  <a:schemeClr val="accent1"/>
+                </a:solidFill>
+              </a14:hiddenFill>
+            </a:ext>
+            <a:ext uri="{91240B29-F687-4F45-9708-019B960494DF}">
+              <a14:hiddenLine xmlns:a14="http://schemas.microsoft.com/office/drawing/2010/main" w="9525">
+                <a:solidFill>
+                  <a:schemeClr val="tx1"/>
+                </a:solidFill>
+                <a:miter lim="800000"/>
+                <a:headEnd/>
+                <a:tailEnd/>
+              </a14:hiddenLine>
+            </a:ext>
+            <a:ext uri="{AF507438-7753-43E0-B8FC-AC1667EBCBE1}">
+              <a14:hiddenEffects xmlns:a14="http://schemas.microsoft.com/office/drawing/2010/main">
+                <a:effectLst>
+                  <a:outerShdw dist="35921" dir="2700000" algn="ctr" rotWithShape="0">
+                    <a:schemeClr val="bg2"/>
+                  </a:outerShdw>
+                </a:effectLst>
+              </a14:hiddenEffects>
+            </a:ext>
+          </a:extLst>
+        </p:spPr>
+      </p:pic>
+      <p:cxnSp>
+        <p:nvCxnSpPr>
+          <p:cNvPr id="5" name="Straight Arrow Connector 4"/>
+          <p:cNvCxnSpPr/>
+          <p:nvPr/>
+        </p:nvCxnSpPr>
+        <p:spPr>
+          <a:xfrm>
+            <a:off x="251520" y="4293096"/>
+            <a:ext cx="396044" cy="792088"/>
+          </a:xfrm>
+          <a:prstGeom prst="straightConnector1">
+            <a:avLst/>
+          </a:prstGeom>
+          <a:ln w="57150">
+            <a:solidFill>
+              <a:srgbClr val="FF0000"/>
+            </a:solidFill>
+            <a:tailEnd type="arrow"/>
+          </a:ln>
+        </p:spPr>
+        <p:style>
+          <a:lnRef idx="1">
+            <a:schemeClr val="accent1"/>
+          </a:lnRef>
+          <a:fillRef idx="0">
+            <a:schemeClr val="accent1"/>
+          </a:fillRef>
+          <a:effectRef idx="0">
+            <a:schemeClr val="accent1"/>
+          </a:effectRef>
+          <a:fontRef idx="minor">
+            <a:schemeClr val="tx1"/>
+          </a:fontRef>
+        </p:style>
+      </p:cxnSp>
+    </p:spTree>
+    <p:extLst>
+      <p:ext uri="{BB962C8B-B14F-4D97-AF65-F5344CB8AC3E}">
+        <p14:creationId xmlns:p14="http://schemas.microsoft.com/office/powerpoint/2010/main" val="2450098524"/>
+      </p:ext>
+    </p:extLst>
+  </p:cSld>
+  <p:clrMapOvr>
+    <a:masterClrMapping/>
+  </p:clrMapOvr>
+</p:sld>
+</file>
+
+<file path=ppt/slides/slide8.xml><?xml version="1.0" encoding="utf-8"?>
+<p:sld xmlns:a="http://schemas.openxmlformats.org/drawingml/2006/main" xmlns:r="http://schemas.openxmlformats.org/officeDocument/2006/relationships" xmlns:p="http://schemas.openxmlformats.org/presentationml/2006/main">
+  <p:cSld>
+    <p:spTree>
+      <p:nvGrpSpPr>
+        <p:cNvPr id="1" name=""/>
+        <p:cNvGrpSpPr/>
+        <p:nvPr/>
+      </p:nvGrpSpPr>
+      <p:grpSpPr>
+        <a:xfrm>
+          <a:off x="0" y="0"/>
+          <a:ext cx="0" cy="0"/>
+          <a:chOff x="0" y="0"/>
+          <a:chExt cx="0" cy="0"/>
+        </a:xfrm>
+      </p:grpSpPr>
+      <p:sp>
+        <p:nvSpPr>
+          <p:cNvPr id="2" name="Title 1"/>
+          <p:cNvSpPr>
+            <a:spLocks noGrp="1"/>
+          </p:cNvSpPr>
+          <p:nvPr>
+            <p:ph type="title"/>
+          </p:nvPr>
+        </p:nvSpPr>
+        <p:spPr/>
+        <p:txBody>
+          <a:bodyPr/>
+          <a:lstStyle/>
+          <a:p>
+            <a:r>
+              <a:rPr lang="en-GB" dirty="0" smtClean="0"/>
+              <a:t>Display an alert on the article</a:t>
+            </a:r>
+            <a:endParaRPr lang="en-GB" dirty="0"/>
+          </a:p>
+        </p:txBody>
+      </p:sp>
+      <p:sp>
+        <p:nvSpPr>
+          <p:cNvPr id="3" name="Content Placeholder 2"/>
+          <p:cNvSpPr>
+            <a:spLocks noGrp="1"/>
+          </p:cNvSpPr>
+          <p:nvPr>
+            <p:ph idx="1"/>
+          </p:nvPr>
+        </p:nvSpPr>
+        <p:spPr/>
+        <p:txBody>
+          <a:bodyPr/>
+          <a:lstStyle/>
+          <a:p>
+            <a:r>
+              <a:rPr lang="en-GB" dirty="0" smtClean="0"/>
+              <a:t>?????</a:t>
+            </a:r>
+            <a:endParaRPr lang="en-GB" dirty="0"/>
+          </a:p>
+        </p:txBody>
+      </p:sp>
+    </p:spTree>
+    <p:extLst>
+      <p:ext uri="{BB962C8B-B14F-4D97-AF65-F5344CB8AC3E}">
+        <p14:creationId xmlns:p14="http://schemas.microsoft.com/office/powerpoint/2010/main" val="1430672218"/>
       </p:ext>
     </p:extLst>
   </p:cSld>

</xml_diff>

<commit_message>
added github link to slides
</commit_message>
<xml_diff>
--- a/presentations/Dataset-update-hack-presentation.pptx
+++ b/presentations/Dataset-update-hack-presentation.pptx
@@ -13,6 +13,7 @@
     <p:sldId id="261" r:id="rId7"/>
     <p:sldId id="262" r:id="rId8"/>
     <p:sldId id="263" r:id="rId9"/>
+    <p:sldId id="264" r:id="rId10"/>
   </p:sldIdLst>
   <p:sldSz cx="9144000" cy="6858000" type="screen4x3"/>
   <p:notesSz cx="6858000" cy="9144000"/>
@@ -4193,19 +4194,7 @@
             </a:r>
             <a:r>
               <a:rPr lang="en-GB" dirty="0" smtClean="0"/>
-              <a:t> </a:t>
-            </a:r>
-            <a:r>
-              <a:rPr lang="en-GB" dirty="0" smtClean="0"/>
-              <a:t>datasets </a:t>
-            </a:r>
-            <a:r>
-              <a:rPr lang="en-GB" dirty="0" smtClean="0"/>
-              <a:t>associated with both articles in the references AND with </a:t>
-            </a:r>
-            <a:r>
-              <a:rPr lang="en-GB" dirty="0" smtClean="0"/>
-              <a:t>the current publication </a:t>
+              <a:t> datasets associated with both articles in the references AND with the current publication </a:t>
             </a:r>
             <a:endParaRPr lang="en-GB" dirty="0"/>
           </a:p>
@@ -4274,6 +4263,99 @@
       </p:par>
     </p:tnLst>
   </p:timing>
+</p:sld>
+</file>
+
+<file path=ppt/slides/slide9.xml><?xml version="1.0" encoding="utf-8"?>
+<p:sld xmlns:a="http://schemas.openxmlformats.org/drawingml/2006/main" xmlns:r="http://schemas.openxmlformats.org/officeDocument/2006/relationships" xmlns:p="http://schemas.openxmlformats.org/presentationml/2006/main">
+  <p:cSld>
+    <p:spTree>
+      <p:nvGrpSpPr>
+        <p:cNvPr id="1" name=""/>
+        <p:cNvGrpSpPr/>
+        <p:nvPr/>
+      </p:nvGrpSpPr>
+      <p:grpSpPr>
+        <a:xfrm>
+          <a:off x="0" y="0"/>
+          <a:ext cx="0" cy="0"/>
+          <a:chOff x="0" y="0"/>
+          <a:chExt cx="0" cy="0"/>
+        </a:xfrm>
+      </p:grpSpPr>
+      <p:sp>
+        <p:nvSpPr>
+          <p:cNvPr id="2" name="Title 1"/>
+          <p:cNvSpPr>
+            <a:spLocks noGrp="1"/>
+          </p:cNvSpPr>
+          <p:nvPr>
+            <p:ph type="title"/>
+          </p:nvPr>
+        </p:nvSpPr>
+        <p:spPr/>
+        <p:txBody>
+          <a:bodyPr/>
+          <a:lstStyle/>
+          <a:p>
+            <a:r>
+              <a:rPr lang="en-GB" dirty="0" smtClean="0"/>
+              <a:t>Our code</a:t>
+            </a:r>
+            <a:endParaRPr lang="en-GB" dirty="0"/>
+          </a:p>
+        </p:txBody>
+      </p:sp>
+      <p:sp>
+        <p:nvSpPr>
+          <p:cNvPr id="3" name="Content Placeholder 2"/>
+          <p:cNvSpPr>
+            <a:spLocks noGrp="1"/>
+          </p:cNvSpPr>
+          <p:nvPr>
+            <p:ph idx="1"/>
+          </p:nvPr>
+        </p:nvSpPr>
+        <p:spPr/>
+        <p:txBody>
+          <a:bodyPr>
+            <a:normAutofit/>
+          </a:bodyPr>
+          <a:lstStyle/>
+          <a:p>
+            <a:r>
+              <a:rPr lang="en-GB" sz="2400" dirty="0">
+                <a:hlinkClick r:id="rId2"/>
+              </a:rPr>
+              <a:t>https://</a:t>
+            </a:r>
+            <a:r>
+              <a:rPr lang="en-GB" sz="2400" dirty="0" smtClean="0">
+                <a:hlinkClick r:id="rId2"/>
+              </a:rPr>
+              <a:t>github.com/ScientificDataLabs/dataset-updates-plugin</a:t>
+            </a:r>
+            <a:endParaRPr lang="en-GB" sz="2400" dirty="0" smtClean="0"/>
+          </a:p>
+          <a:p>
+            <a:r>
+              <a:rPr lang="en-GB" sz="2400" dirty="0" smtClean="0"/>
+              <a:t>MIT licensed</a:t>
+            </a:r>
+            <a:endParaRPr lang="en-GB" sz="2400" dirty="0"/>
+          </a:p>
+        </p:txBody>
+      </p:sp>
+    </p:spTree>
+    <p:extLst>
+      <p:ext uri="{BB962C8B-B14F-4D97-AF65-F5344CB8AC3E}">
+        <p14:creationId xmlns:p14="http://schemas.microsoft.com/office/powerpoint/2010/main" val="3705543198"/>
+      </p:ext>
+    </p:extLst>
+  </p:cSld>
+  <p:clrMapOvr>
+    <a:masterClrMapping/>
+  </p:clrMapOvr>
 </p:sld>
 </file>
 

</xml_diff>